<commit_message>
more journals & mid-year presentation
</commit_message>
<xml_diff>
--- a/Presentations/Midyear_Presentation.pptx
+++ b/Presentations/Midyear_Presentation.pptx
@@ -124,7 +124,7 @@
 <file path=ppt/revisionInfo.xml><?xml version="1.0" encoding="utf-8"?>
 <p1510:revInfo xmlns:a="http://schemas.openxmlformats.org/drawingml/2006/main" xmlns:r="http://schemas.openxmlformats.org/officeDocument/2006/relationships" xmlns:p1510="http://schemas.microsoft.com/office/powerpoint/2015/10/main">
   <p1510:revLst>
-    <p1510:client id="{B96249E1-26C0-4E6C-B4C5-2F117C870BB7}" v="171" dt="2024-01-09T03:06:51.451"/>
+    <p1510:client id="{B96249E1-26C0-4E6C-B4C5-2F117C870BB7}" v="172" dt="2024-01-12T03:15:02.563"/>
   </p1510:revLst>
 </p1510:revInfo>
 </file>
@@ -134,12 +134,12 @@
   <pc:docChgLst>
     <pc:chgData name="Manav Gagvani" userId="c0f92f3d012b9fa0" providerId="LiveId" clId="{B96249E1-26C0-4E6C-B4C5-2F117C870BB7}"/>
     <pc:docChg chg="undo custSel addSld modSld addMainMaster delMainMaster">
-      <pc:chgData name="Manav Gagvani" userId="c0f92f3d012b9fa0" providerId="LiveId" clId="{B96249E1-26C0-4E6C-B4C5-2F117C870BB7}" dt="2024-01-09T03:06:51.451" v="4833"/>
+      <pc:chgData name="Manav Gagvani" userId="c0f92f3d012b9fa0" providerId="LiveId" clId="{B96249E1-26C0-4E6C-B4C5-2F117C870BB7}" dt="2024-01-12T18:00:35.739" v="4866" actId="1076"/>
       <pc:docMkLst>
         <pc:docMk/>
       </pc:docMkLst>
       <pc:sldChg chg="addSp delSp modSp new mod setBg modClrScheme delAnim modAnim chgLayout">
-        <pc:chgData name="Manav Gagvani" userId="c0f92f3d012b9fa0" providerId="LiveId" clId="{B96249E1-26C0-4E6C-B4C5-2F117C870BB7}" dt="2024-01-08T15:53:48.837" v="131" actId="27614"/>
+        <pc:chgData name="Manav Gagvani" userId="c0f92f3d012b9fa0" providerId="LiveId" clId="{B96249E1-26C0-4E6C-B4C5-2F117C870BB7}" dt="2024-01-12T18:00:35.739" v="4866" actId="1076"/>
         <pc:sldMkLst>
           <pc:docMk/>
           <pc:sldMk cId="914040770" sldId="256"/>
@@ -297,7 +297,7 @@
           </ac:picMkLst>
         </pc:picChg>
         <pc:picChg chg="add mod ord">
-          <ac:chgData name="Manav Gagvani" userId="c0f92f3d012b9fa0" providerId="LiveId" clId="{B96249E1-26C0-4E6C-B4C5-2F117C870BB7}" dt="2024-01-08T15:53:48.837" v="131" actId="27614"/>
+          <ac:chgData name="Manav Gagvani" userId="c0f92f3d012b9fa0" providerId="LiveId" clId="{B96249E1-26C0-4E6C-B4C5-2F117C870BB7}" dt="2024-01-12T18:00:35.739" v="4866" actId="1076"/>
           <ac:picMkLst>
             <pc:docMk/>
             <pc:sldMk cId="914040770" sldId="256"/>
@@ -424,7 +424,7 @@
         </pc:cxnChg>
       </pc:sldChg>
       <pc:sldChg chg="addSp modSp new mod setBg modAnim">
-        <pc:chgData name="Manav Gagvani" userId="c0f92f3d012b9fa0" providerId="LiveId" clId="{B96249E1-26C0-4E6C-B4C5-2F117C870BB7}" dt="2024-01-08T16:14:27.327" v="2311" actId="20577"/>
+        <pc:chgData name="Manav Gagvani" userId="c0f92f3d012b9fa0" providerId="LiveId" clId="{B96249E1-26C0-4E6C-B4C5-2F117C870BB7}" dt="2024-01-12T03:15:02.558" v="4834"/>
         <pc:sldMkLst>
           <pc:docMk/>
           <pc:sldMk cId="2107981551" sldId="259"/>
@@ -588,7 +588,7 @@
         </pc:spChg>
       </pc:sldChg>
       <pc:sldChg chg="addSp modSp new mod setBg">
-        <pc:chgData name="Manav Gagvani" userId="c0f92f3d012b9fa0" providerId="LiveId" clId="{B96249E1-26C0-4E6C-B4C5-2F117C870BB7}" dt="2024-01-09T03:00:32.450" v="4828" actId="1076"/>
+        <pc:chgData name="Manav Gagvani" userId="c0f92f3d012b9fa0" providerId="LiveId" clId="{B96249E1-26C0-4E6C-B4C5-2F117C870BB7}" dt="2024-01-12T15:35:01.105" v="4860" actId="113"/>
         <pc:sldMkLst>
           <pc:docMk/>
           <pc:sldMk cId="248739646" sldId="263"/>
@@ -602,7 +602,7 @@
           </ac:spMkLst>
         </pc:spChg>
         <pc:spChg chg="mod">
-          <ac:chgData name="Manav Gagvani" userId="c0f92f3d012b9fa0" providerId="LiveId" clId="{B96249E1-26C0-4E6C-B4C5-2F117C870BB7}" dt="2024-01-09T02:59:55.169" v="4732" actId="27636"/>
+          <ac:chgData name="Manav Gagvani" userId="c0f92f3d012b9fa0" providerId="LiveId" clId="{B96249E1-26C0-4E6C-B4C5-2F117C870BB7}" dt="2024-01-12T15:35:01.105" v="4860" actId="113"/>
           <ac:spMkLst>
             <pc:docMk/>
             <pc:sldMk cId="248739646" sldId="263"/>
@@ -650,14 +650,14 @@
           </ac:cxnSpMkLst>
         </pc:cxnChg>
       </pc:sldChg>
-      <pc:sldChg chg="addSp delSp modSp new mod modAnim">
-        <pc:chgData name="Manav Gagvani" userId="c0f92f3d012b9fa0" providerId="LiveId" clId="{B96249E1-26C0-4E6C-B4C5-2F117C870BB7}" dt="2024-01-09T03:06:51.451" v="4833"/>
+      <pc:sldChg chg="addSp delSp modSp new mod setBg delAnim modAnim">
+        <pc:chgData name="Manav Gagvani" userId="c0f92f3d012b9fa0" providerId="LiveId" clId="{B96249E1-26C0-4E6C-B4C5-2F117C870BB7}" dt="2024-01-12T03:41:14.169" v="4859" actId="732"/>
         <pc:sldMkLst>
           <pc:docMk/>
           <pc:sldMk cId="2666604385" sldId="264"/>
         </pc:sldMkLst>
         <pc:spChg chg="mod">
-          <ac:chgData name="Manav Gagvani" userId="c0f92f3d012b9fa0" providerId="LiveId" clId="{B96249E1-26C0-4E6C-B4C5-2F117C870BB7}" dt="2024-01-08T20:49:57.445" v="4397" actId="20577"/>
+          <ac:chgData name="Manav Gagvani" userId="c0f92f3d012b9fa0" providerId="LiveId" clId="{B96249E1-26C0-4E6C-B4C5-2F117C870BB7}" dt="2024-01-12T03:39:17.929" v="4838" actId="26606"/>
           <ac:spMkLst>
             <pc:docMk/>
             <pc:sldMk cId="2666604385" sldId="264"/>
@@ -672,54 +672,94 @@
             <ac:spMk id="3" creationId="{D76CE76A-DC59-7E04-477D-389EC0E00A89}"/>
           </ac:spMkLst>
         </pc:spChg>
-        <pc:picChg chg="add mod">
-          <ac:chgData name="Manav Gagvani" userId="c0f92f3d012b9fa0" providerId="LiveId" clId="{B96249E1-26C0-4E6C-B4C5-2F117C870BB7}" dt="2024-01-08T20:51:57.806" v="4400" actId="1076"/>
+        <pc:spChg chg="add">
+          <ac:chgData name="Manav Gagvani" userId="c0f92f3d012b9fa0" providerId="LiveId" clId="{B96249E1-26C0-4E6C-B4C5-2F117C870BB7}" dt="2024-01-12T03:39:17.929" v="4838" actId="26606"/>
+          <ac:spMkLst>
+            <pc:docMk/>
+            <pc:sldMk cId="2666604385" sldId="264"/>
+            <ac:spMk id="13" creationId="{39E3965E-AC41-4711-9D10-E25ABB132D86}"/>
+          </ac:spMkLst>
+        </pc:spChg>
+        <pc:spChg chg="add">
+          <ac:chgData name="Manav Gagvani" userId="c0f92f3d012b9fa0" providerId="LiveId" clId="{B96249E1-26C0-4E6C-B4C5-2F117C870BB7}" dt="2024-01-12T03:39:17.929" v="4838" actId="26606"/>
+          <ac:spMkLst>
+            <pc:docMk/>
+            <pc:sldMk cId="2666604385" sldId="264"/>
+            <ac:spMk id="17" creationId="{D1B4E201-164F-4793-895E-C149B2F2FCA0}"/>
+          </ac:spMkLst>
+        </pc:spChg>
+        <pc:spChg chg="add">
+          <ac:chgData name="Manav Gagvani" userId="c0f92f3d012b9fa0" providerId="LiveId" clId="{B96249E1-26C0-4E6C-B4C5-2F117C870BB7}" dt="2024-01-12T03:39:17.929" v="4838" actId="26606"/>
+          <ac:spMkLst>
+            <pc:docMk/>
+            <pc:sldMk cId="2666604385" sldId="264"/>
+            <ac:spMk id="19" creationId="{765F4110-C0FC-4D61-ACD2-A7C950EAE908}"/>
+          </ac:spMkLst>
+        </pc:spChg>
+        <pc:picChg chg="add mod ord modCrop">
+          <ac:chgData name="Manav Gagvani" userId="c0f92f3d012b9fa0" providerId="LiveId" clId="{B96249E1-26C0-4E6C-B4C5-2F117C870BB7}" dt="2024-01-12T03:40:39.984" v="4852" actId="1076"/>
           <ac:picMkLst>
             <pc:docMk/>
             <pc:sldMk cId="2666604385" sldId="264"/>
             <ac:picMk id="4" creationId="{6BED2CDE-9F58-00CC-E284-76567F0DA54F}"/>
           </ac:picMkLst>
         </pc:picChg>
-        <pc:picChg chg="add mod">
-          <ac:chgData name="Manav Gagvani" userId="c0f92f3d012b9fa0" providerId="LiveId" clId="{B96249E1-26C0-4E6C-B4C5-2F117C870BB7}" dt="2024-01-08T20:52:22.581" v="4403" actId="14100"/>
+        <pc:picChg chg="add mod ord">
+          <ac:chgData name="Manav Gagvani" userId="c0f92f3d012b9fa0" providerId="LiveId" clId="{B96249E1-26C0-4E6C-B4C5-2F117C870BB7}" dt="2024-01-12T03:40:47.002" v="4854" actId="14100"/>
           <ac:picMkLst>
             <pc:docMk/>
             <pc:sldMk cId="2666604385" sldId="264"/>
             <ac:picMk id="5" creationId="{00E7DFDE-765C-2EEE-5845-FCE7791DB3B5}"/>
           </ac:picMkLst>
         </pc:picChg>
-        <pc:picChg chg="add mod">
-          <ac:chgData name="Manav Gagvani" userId="c0f92f3d012b9fa0" providerId="LiveId" clId="{B96249E1-26C0-4E6C-B4C5-2F117C870BB7}" dt="2024-01-08T20:52:39.526" v="4408" actId="14100"/>
+        <pc:picChg chg="add mod modCrop">
+          <ac:chgData name="Manav Gagvani" userId="c0f92f3d012b9fa0" providerId="LiveId" clId="{B96249E1-26C0-4E6C-B4C5-2F117C870BB7}" dt="2024-01-12T03:40:25.089" v="4847" actId="14100"/>
           <ac:picMkLst>
             <pc:docMk/>
             <pc:sldMk cId="2666604385" sldId="264"/>
             <ac:picMk id="6" creationId="{4AF84FB6-0854-7739-FDEC-619C2B02A40B}"/>
           </ac:picMkLst>
         </pc:picChg>
-        <pc:picChg chg="add mod modCrop">
-          <ac:chgData name="Manav Gagvani" userId="c0f92f3d012b9fa0" providerId="LiveId" clId="{B96249E1-26C0-4E6C-B4C5-2F117C870BB7}" dt="2024-01-08T20:53:40.457" v="4414" actId="1076"/>
+        <pc:picChg chg="add del mod modCrop">
+          <ac:chgData name="Manav Gagvani" userId="c0f92f3d012b9fa0" providerId="LiveId" clId="{B96249E1-26C0-4E6C-B4C5-2F117C870BB7}" dt="2024-01-12T03:38:41.773" v="4835" actId="478"/>
           <ac:picMkLst>
             <pc:docMk/>
             <pc:sldMk cId="2666604385" sldId="264"/>
             <ac:picMk id="7" creationId="{6048DE4D-F9FC-1AB1-8FD1-9405F383B854}"/>
           </ac:picMkLst>
         </pc:picChg>
-        <pc:picChg chg="add mod">
-          <ac:chgData name="Manav Gagvani" userId="c0f92f3d012b9fa0" providerId="LiveId" clId="{B96249E1-26C0-4E6C-B4C5-2F117C870BB7}" dt="2024-01-08T20:54:30.863" v="4422" actId="1076"/>
+        <pc:picChg chg="add mod modCrop">
+          <ac:chgData name="Manav Gagvani" userId="c0f92f3d012b9fa0" providerId="LiveId" clId="{B96249E1-26C0-4E6C-B4C5-2F117C870BB7}" dt="2024-01-12T03:41:14.169" v="4859" actId="732"/>
           <ac:picMkLst>
             <pc:docMk/>
             <pc:sldMk cId="2666604385" sldId="264"/>
             <ac:picMk id="8" creationId="{B50F9128-BE9A-1FAD-9F2C-DE16AB6B1903}"/>
           </ac:picMkLst>
         </pc:picChg>
-        <pc:picChg chg="add mod">
-          <ac:chgData name="Manav Gagvani" userId="c0f92f3d012b9fa0" providerId="LiveId" clId="{B96249E1-26C0-4E6C-B4C5-2F117C870BB7}" dt="2024-01-08T20:54:54.850" v="4426" actId="1076"/>
+        <pc:picChg chg="add del mod">
+          <ac:chgData name="Manav Gagvani" userId="c0f92f3d012b9fa0" providerId="LiveId" clId="{B96249E1-26C0-4E6C-B4C5-2F117C870BB7}" dt="2024-01-12T03:38:42.317" v="4836" actId="478"/>
           <ac:picMkLst>
             <pc:docMk/>
             <pc:sldMk cId="2666604385" sldId="264"/>
             <ac:picMk id="9" creationId="{77BA129F-AF0E-39A0-3E12-48223BE64B7C}"/>
           </ac:picMkLst>
         </pc:picChg>
+        <pc:cxnChg chg="add">
+          <ac:chgData name="Manav Gagvani" userId="c0f92f3d012b9fa0" providerId="LiveId" clId="{B96249E1-26C0-4E6C-B4C5-2F117C870BB7}" dt="2024-01-12T03:39:17.929" v="4838" actId="26606"/>
+          <ac:cxnSpMkLst>
+            <pc:docMk/>
+            <pc:sldMk cId="2666604385" sldId="264"/>
+            <ac:cxnSpMk id="15" creationId="{1F5DC8C3-BA5F-4EED-BB9A-A14272BD82A1}"/>
+          </ac:cxnSpMkLst>
+        </pc:cxnChg>
+        <pc:cxnChg chg="add">
+          <ac:chgData name="Manav Gagvani" userId="c0f92f3d012b9fa0" providerId="LiveId" clId="{B96249E1-26C0-4E6C-B4C5-2F117C870BB7}" dt="2024-01-12T03:39:17.929" v="4838" actId="26606"/>
+          <ac:cxnSpMkLst>
+            <pc:docMk/>
+            <pc:sldMk cId="2666604385" sldId="264"/>
+            <ac:cxnSpMk id="21" creationId="{FACE2D80-77E9-4433-B62B-693C5B7B2AEF}"/>
+          </ac:cxnSpMkLst>
+        </pc:cxnChg>
       </pc:sldChg>
       <pc:sldChg chg="modSp new mod">
         <pc:chgData name="Manav Gagvani" userId="c0f92f3d012b9fa0" providerId="LiveId" clId="{B96249E1-26C0-4E6C-B4C5-2F117C870BB7}" dt="2024-01-08T20:59:42.490" v="4730" actId="20577"/>
@@ -4038,7 +4078,7 @@
           <a:p>
             <a:fld id="{9184DA70-C731-4C70-880D-CCD4705E623C}" type="datetime1">
               <a:rPr lang="en-US" smtClean="0"/>
-              <a:t>1/8/2024</a:t>
+              <a:t>1/12/2024</a:t>
             </a:fld>
             <a:endParaRPr lang="en-US" dirty="0"/>
           </a:p>
@@ -4226,7 +4266,7 @@
           <a:p>
             <a:fld id="{B612A279-0833-481D-8C56-F67FD0AC6C50}" type="datetime1">
               <a:rPr lang="en-US" smtClean="0"/>
-              <a:t>1/8/2024</a:t>
+              <a:t>1/12/2024</a:t>
             </a:fld>
             <a:endParaRPr lang="en-US" dirty="0"/>
           </a:p>
@@ -4468,7 +4508,7 @@
           <a:p>
             <a:fld id="{6587DA83-5663-4C9C-B9AA-0B40A3DAFF81}" type="datetime1">
               <a:rPr lang="en-US" smtClean="0"/>
-              <a:t>1/8/2024</a:t>
+              <a:t>1/12/2024</a:t>
             </a:fld>
             <a:endParaRPr lang="en-US" dirty="0"/>
           </a:p>
@@ -4656,7 +4696,7 @@
           <a:p>
             <a:fld id="{4BE1D723-8F53-4F53-90B0-1982A396982E}" type="datetime1">
               <a:rPr lang="en-US" smtClean="0"/>
-              <a:t>1/8/2024</a:t>
+              <a:t>1/12/2024</a:t>
             </a:fld>
             <a:endParaRPr lang="en-US" dirty="0"/>
           </a:p>
@@ -5029,7 +5069,7 @@
           <a:p>
             <a:fld id="{97669AF7-7BEB-44E4-9852-375E34362B5B}" type="datetime1">
               <a:rPr lang="en-US" smtClean="0"/>
-              <a:t>1/8/2024</a:t>
+              <a:t>1/12/2024</a:t>
             </a:fld>
             <a:endParaRPr lang="en-US" dirty="0"/>
           </a:p>
@@ -5284,7 +5324,7 @@
           <a:p>
             <a:fld id="{BAAAC38D-0552-4C82-B593-E6124DFADBE2}" type="datetime1">
               <a:rPr lang="en-US" smtClean="0"/>
-              <a:t>1/8/2024</a:t>
+              <a:t>1/12/2024</a:t>
             </a:fld>
             <a:endParaRPr lang="en-US" dirty="0"/>
           </a:p>
@@ -5681,7 +5721,7 @@
           <a:p>
             <a:fld id="{D9DF0F1C-5577-4ACB-BB62-DF8F3C494C7E}" type="datetime1">
               <a:rPr lang="en-US" smtClean="0"/>
-              <a:t>1/8/2024</a:t>
+              <a:t>1/12/2024</a:t>
             </a:fld>
             <a:endParaRPr lang="en-US" dirty="0"/>
           </a:p>
@@ -5817,7 +5857,7 @@
           <a:p>
             <a:fld id="{1775B394-D9F9-4F0C-B15D-605F45CB9E9F}" type="datetime1">
               <a:rPr lang="en-US" smtClean="0"/>
-              <a:t>1/8/2024</a:t>
+              <a:t>1/12/2024</a:t>
             </a:fld>
             <a:endParaRPr lang="en-US" dirty="0"/>
           </a:p>
@@ -5974,7 +6014,7 @@
           <a:p>
             <a:fld id="{39667345-2558-425A-8533-9BFDBCE15005}" type="datetime1">
               <a:rPr lang="en-US" smtClean="0"/>
-              <a:t>1/8/2024</a:t>
+              <a:t>1/12/2024</a:t>
             </a:fld>
             <a:endParaRPr lang="en-US" dirty="0"/>
           </a:p>
@@ -6303,7 +6343,7 @@
           <a:p>
             <a:fld id="{92BEA474-078D-4E9B-9B14-09A87B19DC46}" type="datetime1">
               <a:rPr lang="en-US" smtClean="0"/>
-              <a:t>1/8/2024</a:t>
+              <a:t>1/12/2024</a:t>
             </a:fld>
             <a:endParaRPr lang="en-US" dirty="0"/>
           </a:p>
@@ -6653,7 +6693,7 @@
           <a:p>
             <a:fld id="{4907D986-8816-4272-A432-0437A28A9828}" type="datetime1">
               <a:rPr lang="en-US" smtClean="0"/>
-              <a:t>1/8/2024</a:t>
+              <a:t>1/12/2024</a:t>
             </a:fld>
             <a:endParaRPr lang="en-US" dirty="0"/>
           </a:p>
@@ -6914,7 +6954,7 @@
           <a:p>
             <a:fld id="{62D6E202-B606-4609-B914-27C9371A1F6D}" type="datetime1">
               <a:rPr lang="en-US" smtClean="0"/>
-              <a:t>1/8/2024</a:t>
+              <a:t>1/12/2024</a:t>
             </a:fld>
             <a:endParaRPr lang="en-US" dirty="0"/>
           </a:p>
@@ -7534,8 +7574,8 @@
         </p:blipFill>
         <p:spPr>
           <a:xfrm>
-            <a:off x="2287874" y="643538"/>
-            <a:ext cx="7617352" cy="3618586"/>
+            <a:off x="1877427" y="271506"/>
+            <a:ext cx="8437146" cy="4008025"/>
           </a:xfrm>
           <a:prstGeom prst="rect">
             <a:avLst/>
@@ -8919,6 +8959,9 @@
                     <p:cTn id="3" fill="hold">
                       <p:stCondLst>
                         <p:cond delay="indefinite"/>
+                        <p:cond evt="onBegin" delay="0">
+                          <p:tn val="2"/>
+                        </p:cond>
                       </p:stCondLst>
                       <p:childTnLst>
                         <p:par>
@@ -8928,7 +8971,7 @@
                             </p:stCondLst>
                             <p:childTnLst>
                               <p:par>
-                                <p:cTn id="5" presetID="1" presetClass="mediacall" presetSubtype="0" fill="hold" nodeType="clickEffect">
+                                <p:cTn id="5" presetID="1" presetClass="mediacall" presetSubtype="0" fill="hold" nodeType="afterEffect">
                                   <p:stCondLst>
                                     <p:cond delay="0"/>
                                   </p:stCondLst>
@@ -9708,7 +9751,15 @@
                   <a:srgbClr val="FFFFFF"/>
                 </a:solidFill>
               </a:rPr>
-              <a:t>The autoencoder is trained on manual driving – jump-starting the RL with human intuition</a:t>
+              <a:t>The autoencoder is trained on manual driving – </a:t>
+            </a:r>
+            <a:r>
+              <a:rPr lang="en-US" sz="1500" b="1" dirty="0">
+                <a:solidFill>
+                  <a:srgbClr val="FFFFFF"/>
+                </a:solidFill>
+              </a:rPr>
+              <a:t>jump-starting the RL with human intuition</a:t>
             </a:r>
           </a:p>
         </p:txBody>
@@ -9774,6 +9825,14 @@
 <file path=ppt/slides/slide9.xml><?xml version="1.0" encoding="utf-8"?>
 <p:sld xmlns:a="http://schemas.openxmlformats.org/drawingml/2006/main" xmlns:r="http://schemas.openxmlformats.org/officeDocument/2006/relationships" xmlns:p="http://schemas.openxmlformats.org/presentationml/2006/main">
   <p:cSld>
+    <p:bg>
+      <p:bgPr>
+        <a:solidFill>
+          <a:schemeClr val="bg1"/>
+        </a:solidFill>
+        <a:effectLst/>
+      </p:bgPr>
+    </p:bg>
     <p:spTree>
       <p:nvGrpSpPr>
         <p:cNvPr id="1" name=""/>
@@ -9790,6 +9849,249 @@
       </p:grpSpPr>
       <p:sp>
         <p:nvSpPr>
+          <p:cNvPr id="13" name="Rectangle 12">
+            <a:extLst>
+              <a:ext uri="{FF2B5EF4-FFF2-40B4-BE49-F238E27FC236}">
+                <a16:creationId xmlns:a16="http://schemas.microsoft.com/office/drawing/2014/main" id="{39E3965E-AC41-4711-9D10-E25ABB132D86}"/>
+              </a:ext>
+              <a:ext uri="{C183D7F6-B498-43B3-948B-1728B52AA6E4}">
+                <adec:decorative xmlns:adec="http://schemas.microsoft.com/office/drawing/2017/decorative" val="1"/>
+              </a:ext>
+            </a:extLst>
+          </p:cNvPr>
+          <p:cNvSpPr>
+            <a:spLocks noGrp="1" noRot="1" noChangeAspect="1" noMove="1" noResize="1" noEditPoints="1" noAdjustHandles="1" noChangeArrowheads="1" noChangeShapeType="1" noTextEdit="1"/>
+          </p:cNvSpPr>
+          <p:nvPr>
+            <p:extLst>
+              <p:ext uri="{386F3935-93C4-4BCD-93E2-E3B085C9AB24}">
+                <p16:designElem xmlns:p16="http://schemas.microsoft.com/office/powerpoint/2015/main" val="1"/>
+              </p:ext>
+            </p:extLst>
+          </p:nvPr>
+        </p:nvSpPr>
+        <p:spPr>
+          <a:xfrm>
+            <a:off x="3175" y="6400800"/>
+            <a:ext cx="12188825" cy="457200"/>
+          </a:xfrm>
+          <a:prstGeom prst="rect">
+            <a:avLst/>
+          </a:prstGeom>
+          <a:solidFill>
+            <a:srgbClr val="262626"/>
+          </a:solidFill>
+          <a:ln>
+            <a:noFill/>
+          </a:ln>
+        </p:spPr>
+        <p:style>
+          <a:lnRef idx="2">
+            <a:schemeClr val="accent1">
+              <a:shade val="50000"/>
+            </a:schemeClr>
+          </a:lnRef>
+          <a:fillRef idx="1">
+            <a:schemeClr val="accent1"/>
+          </a:fillRef>
+          <a:effectRef idx="0">
+            <a:schemeClr val="accent1"/>
+          </a:effectRef>
+          <a:fontRef idx="minor">
+            <a:schemeClr val="lt1"/>
+          </a:fontRef>
+        </p:style>
+        <p:txBody>
+          <a:bodyPr/>
+          <a:lstStyle/>
+          <a:p>
+            <a:endParaRPr lang="en-US"/>
+          </a:p>
+        </p:txBody>
+      </p:sp>
+      <p:cxnSp>
+        <p:nvCxnSpPr>
+          <p:cNvPr id="15" name="Straight Connector 14">
+            <a:extLst>
+              <a:ext uri="{FF2B5EF4-FFF2-40B4-BE49-F238E27FC236}">
+                <a16:creationId xmlns:a16="http://schemas.microsoft.com/office/drawing/2014/main" id="{1F5DC8C3-BA5F-4EED-BB9A-A14272BD82A1}"/>
+              </a:ext>
+              <a:ext uri="{C183D7F6-B498-43B3-948B-1728B52AA6E4}">
+                <adec:decorative xmlns:adec="http://schemas.microsoft.com/office/drawing/2017/decorative" val="1"/>
+              </a:ext>
+            </a:extLst>
+          </p:cNvPr>
+          <p:cNvCxnSpPr>
+            <a:cxnSpLocks noGrp="1" noRot="1" noChangeAspect="1" noMove="1" noResize="1" noEditPoints="1" noAdjustHandles="1" noChangeArrowheads="1" noChangeShapeType="1"/>
+          </p:cNvCxnSpPr>
+          <p:nvPr>
+            <p:extLst>
+              <p:ext uri="{386F3935-93C4-4BCD-93E2-E3B085C9AB24}">
+                <p16:designElem xmlns:p16="http://schemas.microsoft.com/office/powerpoint/2015/main" val="1"/>
+              </p:ext>
+            </p:extLst>
+          </p:nvPr>
+        </p:nvCxnSpPr>
+        <p:spPr>
+          <a:xfrm>
+            <a:off x="1207658" y="4474741"/>
+            <a:ext cx="9875520" cy="0"/>
+          </a:xfrm>
+          <a:prstGeom prst="line">
+            <a:avLst/>
+          </a:prstGeom>
+          <a:ln w="12700">
+            <a:solidFill>
+              <a:schemeClr val="tx1">
+                <a:lumMod val="75000"/>
+                <a:lumOff val="25000"/>
+              </a:schemeClr>
+            </a:solidFill>
+          </a:ln>
+        </p:spPr>
+        <p:style>
+          <a:lnRef idx="1">
+            <a:schemeClr val="accent1"/>
+          </a:lnRef>
+          <a:fillRef idx="0">
+            <a:schemeClr val="accent1"/>
+          </a:fillRef>
+          <a:effectRef idx="0">
+            <a:schemeClr val="accent1"/>
+          </a:effectRef>
+          <a:fontRef idx="minor">
+            <a:schemeClr val="tx1"/>
+          </a:fontRef>
+        </p:style>
+      </p:cxnSp>
+      <p:sp>
+        <p:nvSpPr>
+          <p:cNvPr id="17" name="Rectangle 16">
+            <a:extLst>
+              <a:ext uri="{FF2B5EF4-FFF2-40B4-BE49-F238E27FC236}">
+                <a16:creationId xmlns:a16="http://schemas.microsoft.com/office/drawing/2014/main" id="{D1B4E201-164F-4793-895E-C149B2F2FCA0}"/>
+              </a:ext>
+              <a:ext uri="{C183D7F6-B498-43B3-948B-1728B52AA6E4}">
+                <adec:decorative xmlns:adec="http://schemas.microsoft.com/office/drawing/2017/decorative" val="1"/>
+              </a:ext>
+            </a:extLst>
+          </p:cNvPr>
+          <p:cNvSpPr>
+            <a:spLocks noGrp="1" noRot="1" noChangeAspect="1" noMove="1" noResize="1" noEditPoints="1" noAdjustHandles="1" noChangeArrowheads="1" noChangeShapeType="1" noTextEdit="1"/>
+          </p:cNvSpPr>
+          <p:nvPr>
+            <p:extLst>
+              <p:ext uri="{386F3935-93C4-4BCD-93E2-E3B085C9AB24}">
+                <p16:designElem xmlns:p16="http://schemas.microsoft.com/office/powerpoint/2015/main" val="1"/>
+              </p:ext>
+            </p:extLst>
+          </p:nvPr>
+        </p:nvSpPr>
+        <p:spPr>
+          <a:xfrm>
+            <a:off x="0" y="0"/>
+            <a:ext cx="12192000" cy="6858000"/>
+          </a:xfrm>
+          <a:prstGeom prst="rect">
+            <a:avLst/>
+          </a:prstGeom>
+          <a:solidFill>
+            <a:schemeClr val="bg1"/>
+          </a:solidFill>
+          <a:ln>
+            <a:noFill/>
+          </a:ln>
+        </p:spPr>
+        <p:style>
+          <a:lnRef idx="2">
+            <a:schemeClr val="accent1">
+              <a:shade val="50000"/>
+            </a:schemeClr>
+          </a:lnRef>
+          <a:fillRef idx="1">
+            <a:schemeClr val="accent1"/>
+          </a:fillRef>
+          <a:effectRef idx="0">
+            <a:schemeClr val="accent1"/>
+          </a:effectRef>
+          <a:fontRef idx="minor">
+            <a:schemeClr val="lt1"/>
+          </a:fontRef>
+        </p:style>
+        <p:txBody>
+          <a:bodyPr rtlCol="0" anchor="ctr"/>
+          <a:lstStyle/>
+          <a:p>
+            <a:pPr algn="ctr"/>
+            <a:endParaRPr lang="en-US"/>
+          </a:p>
+        </p:txBody>
+      </p:sp>
+      <p:sp>
+        <p:nvSpPr>
+          <p:cNvPr id="19" name="Rectangle 18">
+            <a:extLst>
+              <a:ext uri="{FF2B5EF4-FFF2-40B4-BE49-F238E27FC236}">
+                <a16:creationId xmlns:a16="http://schemas.microsoft.com/office/drawing/2014/main" id="{765F4110-C0FC-4D61-ACD2-A7C950EAE908}"/>
+              </a:ext>
+              <a:ext uri="{C183D7F6-B498-43B3-948B-1728B52AA6E4}">
+                <adec:decorative xmlns:adec="http://schemas.microsoft.com/office/drawing/2017/decorative" val="1"/>
+              </a:ext>
+            </a:extLst>
+          </p:cNvPr>
+          <p:cNvSpPr>
+            <a:spLocks noGrp="1" noRot="1" noChangeAspect="1" noMove="1" noResize="1" noEditPoints="1" noAdjustHandles="1" noChangeArrowheads="1" noChangeShapeType="1" noTextEdit="1"/>
+          </p:cNvSpPr>
+          <p:nvPr>
+            <p:extLst>
+              <p:ext uri="{386F3935-93C4-4BCD-93E2-E3B085C9AB24}">
+                <p16:designElem xmlns:p16="http://schemas.microsoft.com/office/powerpoint/2015/main" val="1"/>
+              </p:ext>
+            </p:extLst>
+          </p:nvPr>
+        </p:nvSpPr>
+        <p:spPr bwMode="ltGray">
+          <a:xfrm>
+            <a:off x="4660711" y="3506289"/>
+            <a:ext cx="7210670" cy="2967839"/>
+          </a:xfrm>
+          <a:prstGeom prst="rect">
+            <a:avLst/>
+          </a:prstGeom>
+          <a:solidFill>
+            <a:srgbClr val="593D47"/>
+          </a:solidFill>
+          <a:ln w="127000" cap="sq" cmpd="thinThick">
+            <a:noFill/>
+          </a:ln>
+        </p:spPr>
+        <p:style>
+          <a:lnRef idx="2">
+            <a:schemeClr val="accent1">
+              <a:shade val="50000"/>
+            </a:schemeClr>
+          </a:lnRef>
+          <a:fillRef idx="1">
+            <a:schemeClr val="accent1"/>
+          </a:fillRef>
+          <a:effectRef idx="0">
+            <a:schemeClr val="accent1"/>
+          </a:effectRef>
+          <a:fontRef idx="minor">
+            <a:schemeClr val="lt1"/>
+          </a:fontRef>
+        </p:style>
+        <p:txBody>
+          <a:bodyPr rtlCol="0" anchor="ctr"/>
+          <a:lstStyle/>
+          <a:p>
+            <a:pPr algn="ctr"/>
+            <a:endParaRPr lang="en-US"/>
+          </a:p>
+        </p:txBody>
+      </p:sp>
+      <p:sp>
+        <p:nvSpPr>
           <p:cNvPr id="2" name="Title 1">
             <a:extLst>
               <a:ext uri="{FF2B5EF4-FFF2-40B4-BE49-F238E27FC236}">
@@ -9804,13 +10106,24 @@
             <p:ph type="title"/>
           </p:nvPr>
         </p:nvSpPr>
-        <p:spPr/>
+        <p:spPr>
+          <a:xfrm>
+            <a:off x="5021821" y="3812955"/>
+            <a:ext cx="6465287" cy="1486192"/>
+          </a:xfrm>
+        </p:spPr>
         <p:txBody>
-          <a:bodyPr/>
+          <a:bodyPr vert="horz" lIns="91440" tIns="45720" rIns="91440" bIns="45720" rtlCol="0" anchor="b">
+            <a:normAutofit/>
+          </a:bodyPr>
           <a:lstStyle/>
           <a:p>
             <a:r>
-              <a:rPr lang="en-US" dirty="0"/>
+              <a:rPr lang="en-US" sz="5000" dirty="0">
+                <a:solidFill>
+                  <a:schemeClr val="bg1"/>
+                </a:solidFill>
+              </a:rPr>
               <a:t>3. Real Car Assembly and Motor Testing</a:t>
             </a:r>
           </a:p>
@@ -9818,10 +10131,10 @@
       </p:sp>
       <p:pic>
         <p:nvPicPr>
-          <p:cNvPr id="4" name="Picture 3" descr="A computer screen shot of a machine&#10;&#10;Description automatically generated">
+          <p:cNvPr id="6" name="Picture 5" descr="A remote control car on a desk&#10;&#10;Description automatically generated">
             <a:extLst>
               <a:ext uri="{FF2B5EF4-FFF2-40B4-BE49-F238E27FC236}">
-                <a16:creationId xmlns:a16="http://schemas.microsoft.com/office/drawing/2014/main" id="{6BED2CDE-9F58-00CC-E284-76567F0DA54F}"/>
+                <a16:creationId xmlns:a16="http://schemas.microsoft.com/office/drawing/2014/main" id="{4AF84FB6-0854-7739-FDEC-619C2B02A40B}"/>
               </a:ext>
             </a:extLst>
           </p:cNvPr>
@@ -9831,32 +10144,24 @@
           <p:nvPr/>
         </p:nvPicPr>
         <p:blipFill rotWithShape="1">
-          <a:blip r:embed="rId2" cstate="print">
+          <a:blip r:embed="rId2">
             <a:extLst>
               <a:ext uri="{28A0092B-C50C-407E-A947-70E740481C1C}">
                 <a14:useLocalDpi xmlns:a14="http://schemas.microsoft.com/office/drawing/2010/main" val="0"/>
               </a:ext>
             </a:extLst>
           </a:blip>
-          <a:srcRect l="15058"/>
+          <a:srcRect l="12989" t="2" r="17743" b="2"/>
           <a:stretch/>
         </p:blipFill>
-        <p:spPr bwMode="auto">
+        <p:spPr>
           <a:xfrm>
-            <a:off x="467868" y="2053082"/>
-            <a:ext cx="3429000" cy="2075180"/>
+            <a:off x="643676" y="3491138"/>
+            <a:ext cx="3654823" cy="2967839"/>
           </a:xfrm>
           <a:prstGeom prst="rect">
             <a:avLst/>
           </a:prstGeom>
-          <a:ln>
-            <a:noFill/>
-          </a:ln>
-          <a:extLst>
-            <a:ext uri="{53640926-AAD7-44D8-BBD7-CCE9431645EC}">
-              <a14:shadowObscured xmlns:a14="http://schemas.microsoft.com/office/drawing/2010/main"/>
-            </a:ext>
-          </a:extLst>
         </p:spPr>
       </p:pic>
       <p:pic>
@@ -9876,7 +10181,7 @@
           </p:cNvPicPr>
           <p:nvPr/>
         </p:nvPicPr>
-        <p:blipFill>
+        <p:blipFill rotWithShape="1">
           <a:blip r:embed="rId3" cstate="print">
             <a:extLst>
               <a:ext uri="{28A0092B-C50C-407E-A947-70E740481C1C}">
@@ -9884,14 +10189,13 @@
               </a:ext>
             </a:extLst>
           </a:blip>
-          <a:stretch>
-            <a:fillRect/>
-          </a:stretch>
+          <a:srcRect r="-5" b="13146"/>
+          <a:stretch/>
         </p:blipFill>
         <p:spPr>
           <a:xfrm rot="5400000">
-            <a:off x="4733514" y="1512030"/>
-            <a:ext cx="2246358" cy="2994836"/>
+            <a:off x="4148185" y="142398"/>
+            <a:ext cx="2975502" cy="3445613"/>
           </a:xfrm>
           <a:prstGeom prst="rect">
             <a:avLst/>
@@ -9900,10 +10204,10 @@
       </p:pic>
       <p:pic>
         <p:nvPicPr>
-          <p:cNvPr id="6" name="Picture 5" descr="A remote control car on a desk&#10;&#10;Description automatically generated">
+          <p:cNvPr id="8" name="Picture 7" descr="A screen shot of a graph&#10;&#10;Description automatically generated">
             <a:extLst>
               <a:ext uri="{FF2B5EF4-FFF2-40B4-BE49-F238E27FC236}">
-                <a16:creationId xmlns:a16="http://schemas.microsoft.com/office/drawing/2014/main" id="{4AF84FB6-0854-7739-FDEC-619C2B02A40B}"/>
+                <a16:creationId xmlns:a16="http://schemas.microsoft.com/office/drawing/2014/main" id="{B50F9128-BE9A-1FAD-9F2C-DE16AB6B1903}"/>
               </a:ext>
             </a:extLst>
           </p:cNvPr>
@@ -9912,34 +10216,81 @@
           </p:cNvPicPr>
           <p:nvPr/>
         </p:nvPicPr>
-        <p:blipFill>
-          <a:blip r:embed="rId4">
-            <a:extLst>
-              <a:ext uri="{28A0092B-C50C-407E-A947-70E740481C1C}">
-                <a14:useLocalDpi xmlns:a14="http://schemas.microsoft.com/office/drawing/2010/main" val="0"/>
-              </a:ext>
-            </a:extLst>
-          </a:blip>
-          <a:stretch>
-            <a:fillRect/>
-          </a:stretch>
+        <p:blipFill rotWithShape="1">
+          <a:blip r:embed="rId4"/>
+          <a:srcRect l="16893" r="2089" b="3"/>
+          <a:stretch/>
         </p:blipFill>
         <p:spPr>
           <a:xfrm>
-            <a:off x="7516918" y="1886269"/>
-            <a:ext cx="3985009" cy="2241993"/>
+            <a:off x="7457774" y="288778"/>
+            <a:ext cx="4413607" cy="3064178"/>
           </a:xfrm>
           <a:prstGeom prst="rect">
             <a:avLst/>
           </a:prstGeom>
         </p:spPr>
       </p:pic>
+      <p:cxnSp>
+        <p:nvCxnSpPr>
+          <p:cNvPr id="21" name="Straight Connector 20">
+            <a:extLst>
+              <a:ext uri="{FF2B5EF4-FFF2-40B4-BE49-F238E27FC236}">
+                <a16:creationId xmlns:a16="http://schemas.microsoft.com/office/drawing/2014/main" id="{FACE2D80-77E9-4433-B62B-693C5B7B2AEF}"/>
+              </a:ext>
+              <a:ext uri="{C183D7F6-B498-43B3-948B-1728B52AA6E4}">
+                <adec:decorative xmlns:adec="http://schemas.microsoft.com/office/drawing/2017/decorative" val="1"/>
+              </a:ext>
+            </a:extLst>
+          </p:cNvPr>
+          <p:cNvCxnSpPr>
+            <a:cxnSpLocks noGrp="1" noRot="1" noChangeAspect="1" noMove="1" noResize="1" noEditPoints="1" noAdjustHandles="1" noChangeArrowheads="1" noChangeShapeType="1"/>
+          </p:cNvCxnSpPr>
+          <p:nvPr>
+            <p:extLst>
+              <p:ext uri="{386F3935-93C4-4BCD-93E2-E3B085C9AB24}">
+                <p16:designElem xmlns:p16="http://schemas.microsoft.com/office/powerpoint/2015/main" val="1"/>
+              </p:ext>
+            </p:extLst>
+          </p:nvPr>
+        </p:nvCxnSpPr>
+        <p:spPr>
+          <a:xfrm>
+            <a:off x="5110211" y="5393160"/>
+            <a:ext cx="6309360" cy="0"/>
+          </a:xfrm>
+          <a:prstGeom prst="line">
+            <a:avLst/>
+          </a:prstGeom>
+          <a:ln w="19050">
+            <a:solidFill>
+              <a:schemeClr val="accent1">
+                <a:alpha val="90000"/>
+              </a:schemeClr>
+            </a:solidFill>
+          </a:ln>
+        </p:spPr>
+        <p:style>
+          <a:lnRef idx="1">
+            <a:schemeClr val="accent1"/>
+          </a:lnRef>
+          <a:fillRef idx="0">
+            <a:schemeClr val="accent1"/>
+          </a:fillRef>
+          <a:effectRef idx="0">
+            <a:schemeClr val="accent1"/>
+          </a:effectRef>
+          <a:fontRef idx="minor">
+            <a:schemeClr val="tx1"/>
+          </a:fontRef>
+        </p:style>
+      </p:cxnSp>
       <p:pic>
         <p:nvPicPr>
-          <p:cNvPr id="7" name="Picture 6" descr="A graph of a diagram&#10;&#10;Description automatically generated with medium confidence">
+          <p:cNvPr id="4" name="Picture 3" descr="A computer screen shot of a machine&#10;&#10;Description automatically generated">
             <a:extLst>
               <a:ext uri="{FF2B5EF4-FFF2-40B4-BE49-F238E27FC236}">
-                <a16:creationId xmlns:a16="http://schemas.microsoft.com/office/drawing/2014/main" id="{6048DE4D-F9FC-1AB1-8FD1-9405F383B854}"/>
+                <a16:creationId xmlns:a16="http://schemas.microsoft.com/office/drawing/2014/main" id="{6BED2CDE-9F58-00CC-E284-76567F0DA54F}"/>
               </a:ext>
             </a:extLst>
           </p:cNvPr>
@@ -9956,87 +10307,22 @@
               </a:ext>
             </a:extLst>
           </a:blip>
-          <a:srcRect r="14514"/>
+          <a:srcRect l="30092" r="14891"/>
           <a:stretch/>
         </p:blipFill>
         <p:spPr bwMode="auto">
           <a:xfrm>
-            <a:off x="1225626" y="4236200"/>
-            <a:ext cx="1913484" cy="2023745"/>
+            <a:off x="643676" y="382398"/>
+            <a:ext cx="3170422" cy="2967839"/>
           </a:xfrm>
           <a:prstGeom prst="rect">
             <a:avLst/>
           </a:prstGeom>
-          <a:noFill/>
-          <a:ln>
-            <a:noFill/>
-          </a:ln>
-        </p:spPr>
-      </p:pic>
-      <p:pic>
-        <p:nvPicPr>
-          <p:cNvPr id="8" name="Picture 7" descr="A screen shot of a graph&#10;&#10;Description automatically generated">
-            <a:extLst>
-              <a:ext uri="{FF2B5EF4-FFF2-40B4-BE49-F238E27FC236}">
-                <a16:creationId xmlns:a16="http://schemas.microsoft.com/office/drawing/2014/main" id="{B50F9128-BE9A-1FAD-9F2C-DE16AB6B1903}"/>
-              </a:ext>
-            </a:extLst>
-          </p:cNvPr>
-          <p:cNvPicPr>
-            <a:picLocks noChangeAspect="1"/>
-          </p:cNvPicPr>
-          <p:nvPr/>
-        </p:nvPicPr>
-        <p:blipFill>
-          <a:blip r:embed="rId6"/>
-          <a:stretch>
-            <a:fillRect/>
-          </a:stretch>
-        </p:blipFill>
-        <p:spPr>
-          <a:xfrm>
-            <a:off x="7711470" y="4236200"/>
-            <a:ext cx="3597769" cy="2023745"/>
-          </a:xfrm>
-          <a:prstGeom prst="rect">
-            <a:avLst/>
-          </a:prstGeom>
-        </p:spPr>
-      </p:pic>
-      <p:pic>
-        <p:nvPicPr>
-          <p:cNvPr id="9" name="Picture 8">
-            <a:extLst>
-              <a:ext uri="{FF2B5EF4-FFF2-40B4-BE49-F238E27FC236}">
-                <a16:creationId xmlns:a16="http://schemas.microsoft.com/office/drawing/2014/main" id="{77BA129F-AF0E-39A0-3E12-48223BE64B7C}"/>
-              </a:ext>
-            </a:extLst>
-          </p:cNvPr>
-          <p:cNvPicPr>
-            <a:picLocks noChangeAspect="1"/>
-          </p:cNvPicPr>
-          <p:nvPr/>
-        </p:nvPicPr>
-        <p:blipFill>
-          <a:blip r:embed="rId7">
-            <a:extLst>
-              <a:ext uri="{28A0092B-C50C-407E-A947-70E740481C1C}">
-                <a14:useLocalDpi xmlns:a14="http://schemas.microsoft.com/office/drawing/2010/main" val="0"/>
-              </a:ext>
-            </a:extLst>
-          </a:blip>
-          <a:stretch>
-            <a:fillRect/>
-          </a:stretch>
-        </p:blipFill>
-        <p:spPr>
-          <a:xfrm>
-            <a:off x="3502456" y="4611133"/>
-            <a:ext cx="3845668" cy="1273878"/>
-          </a:xfrm>
-          <a:prstGeom prst="rect">
-            <a:avLst/>
-          </a:prstGeom>
+          <a:extLst>
+            <a:ext uri="{53640926-AAD7-44D8-BBD7-CCE9431645EC}">
+              <a14:shadowObscured xmlns:a14="http://schemas.microsoft.com/office/drawing/2010/main"/>
+            </a:ext>
+          </a:extLst>
         </p:spPr>
       </p:pic>
     </p:spTree>
@@ -10168,96 +10454,6 @@
                                     <p:set>
                                       <p:cBhvr>
                                         <p:cTn id="14" dur="1" fill="hold">
-                                          <p:stCondLst>
-                                            <p:cond delay="0"/>
-                                          </p:stCondLst>
-                                        </p:cTn>
-                                        <p:tgtEl>
-                                          <p:spTgt spid="7"/>
-                                        </p:tgtEl>
-                                        <p:attrNameLst>
-                                          <p:attrName>style.visibility</p:attrName>
-                                        </p:attrNameLst>
-                                      </p:cBhvr>
-                                      <p:to>
-                                        <p:strVal val="visible"/>
-                                      </p:to>
-                                    </p:set>
-                                  </p:childTnLst>
-                                </p:cTn>
-                              </p:par>
-                            </p:childTnLst>
-                          </p:cTn>
-                        </p:par>
-                      </p:childTnLst>
-                    </p:cTn>
-                  </p:par>
-                  <p:par>
-                    <p:cTn id="15" fill="hold">
-                      <p:stCondLst>
-                        <p:cond delay="indefinite"/>
-                      </p:stCondLst>
-                      <p:childTnLst>
-                        <p:par>
-                          <p:cTn id="16" fill="hold">
-                            <p:stCondLst>
-                              <p:cond delay="0"/>
-                            </p:stCondLst>
-                            <p:childTnLst>
-                              <p:par>
-                                <p:cTn id="17" presetID="1" presetClass="entr" presetSubtype="0" fill="hold" nodeType="clickEffect">
-                                  <p:stCondLst>
-                                    <p:cond delay="0"/>
-                                  </p:stCondLst>
-                                  <p:childTnLst>
-                                    <p:set>
-                                      <p:cBhvr>
-                                        <p:cTn id="18" dur="1" fill="hold">
-                                          <p:stCondLst>
-                                            <p:cond delay="0"/>
-                                          </p:stCondLst>
-                                        </p:cTn>
-                                        <p:tgtEl>
-                                          <p:spTgt spid="9"/>
-                                        </p:tgtEl>
-                                        <p:attrNameLst>
-                                          <p:attrName>style.visibility</p:attrName>
-                                        </p:attrNameLst>
-                                      </p:cBhvr>
-                                      <p:to>
-                                        <p:strVal val="visible"/>
-                                      </p:to>
-                                    </p:set>
-                                  </p:childTnLst>
-                                </p:cTn>
-                              </p:par>
-                            </p:childTnLst>
-                          </p:cTn>
-                        </p:par>
-                      </p:childTnLst>
-                    </p:cTn>
-                  </p:par>
-                  <p:par>
-                    <p:cTn id="19" fill="hold">
-                      <p:stCondLst>
-                        <p:cond delay="indefinite"/>
-                      </p:stCondLst>
-                      <p:childTnLst>
-                        <p:par>
-                          <p:cTn id="20" fill="hold">
-                            <p:stCondLst>
-                              <p:cond delay="0"/>
-                            </p:stCondLst>
-                            <p:childTnLst>
-                              <p:par>
-                                <p:cTn id="21" presetID="1" presetClass="entr" presetSubtype="0" fill="hold" nodeType="clickEffect">
-                                  <p:stCondLst>
-                                    <p:cond delay="0"/>
-                                  </p:stCondLst>
-                                  <p:childTnLst>
-                                    <p:set>
-                                      <p:cBhvr>
-                                        <p:cTn id="22" dur="1" fill="hold">
                                           <p:stCondLst>
                                             <p:cond delay="0"/>
                                           </p:stCondLst>

</xml_diff>